<commit_message>
Upload From Google Collab
</commit_message>
<xml_diff>
--- a/003 - Commerce Commission Quick Explaination & Docs.pptx
+++ b/003 - Commerce Commission Quick Explaination & Docs.pptx
@@ -5,16 +5,15 @@
     <p:sldMasterId id="2147483746" r:id="rId4"/>
   </p:sldMasterIdLst>
   <p:notesMasterIdLst>
-    <p:notesMasterId r:id="rId12"/>
+    <p:notesMasterId r:id="rId11"/>
   </p:notesMasterIdLst>
   <p:sldIdLst>
     <p:sldId id="257" r:id="rId5"/>
     <p:sldId id="259" r:id="rId6"/>
     <p:sldId id="258" r:id="rId7"/>
-    <p:sldId id="260" r:id="rId8"/>
-    <p:sldId id="261" r:id="rId9"/>
-    <p:sldId id="262" r:id="rId10"/>
-    <p:sldId id="263" r:id="rId11"/>
+    <p:sldId id="261" r:id="rId8"/>
+    <p:sldId id="262" r:id="rId9"/>
+    <p:sldId id="263" r:id="rId10"/>
   </p:sldIdLst>
   <p:sldSz cx="12192000" cy="6858000"/>
   <p:notesSz cx="6858000" cy="9144000"/>
@@ -3252,594 +3251,6 @@
         <p:cNvPr id="1" name="">
           <a:extLst>
             <a:ext uri="{FF2B5EF4-FFF2-40B4-BE49-F238E27FC236}">
-              <a16:creationId xmlns:a16="http://schemas.microsoft.com/office/drawing/2014/main" id="{5109FC8D-FBD0-F2A6-194A-C3F46BCB8244}"/>
-            </a:ext>
-          </a:extLst>
-        </p:cNvPr>
-        <p:cNvGrpSpPr/>
-        <p:nvPr/>
-      </p:nvGrpSpPr>
-      <p:grpSpPr>
-        <a:xfrm>
-          <a:off x="0" y="0"/>
-          <a:ext cx="0" cy="0"/>
-          <a:chOff x="0" y="0"/>
-          <a:chExt cx="0" cy="0"/>
-        </a:xfrm>
-      </p:grpSpPr>
-      <p:sp>
-        <p:nvSpPr>
-          <p:cNvPr id="2" name="Slide Image Placeholder 1">
-            <a:extLst>
-              <a:ext uri="{FF2B5EF4-FFF2-40B4-BE49-F238E27FC236}">
-                <a16:creationId xmlns:a16="http://schemas.microsoft.com/office/drawing/2014/main" id="{EF0D6355-94AF-B5F3-FE4F-58B5F7641E6C}"/>
-              </a:ext>
-            </a:extLst>
-          </p:cNvPr>
-          <p:cNvSpPr>
-            <a:spLocks noGrp="1" noRot="1" noChangeAspect="1"/>
-          </p:cNvSpPr>
-          <p:nvPr>
-            <p:ph type="sldImg"/>
-          </p:nvPr>
-        </p:nvSpPr>
-        <p:spPr/>
-      </p:sp>
-      <p:sp>
-        <p:nvSpPr>
-          <p:cNvPr id="3" name="Notes Placeholder 2">
-            <a:extLst>
-              <a:ext uri="{FF2B5EF4-FFF2-40B4-BE49-F238E27FC236}">
-                <a16:creationId xmlns:a16="http://schemas.microsoft.com/office/drawing/2014/main" id="{53F22C4D-A987-6C7C-AC3F-170223FEC9F5}"/>
-              </a:ext>
-            </a:extLst>
-          </p:cNvPr>
-          <p:cNvSpPr>
-            <a:spLocks noGrp="1"/>
-          </p:cNvSpPr>
-          <p:nvPr>
-            <p:ph type="body" idx="1"/>
-          </p:nvPr>
-        </p:nvSpPr>
-        <p:spPr/>
-        <p:txBody>
-          <a:bodyPr/>
-          <a:lstStyle/>
-          <a:p>
-            <a:pPr marL="0" marR="0" lvl="0" indent="0" algn="l" defTabSz="914400" rtl="0" eaLnBrk="1" fontAlgn="auto" latinLnBrk="0" hangingPunct="1">
-              <a:lnSpc>
-                <a:spcPct val="100000"/>
-              </a:lnSpc>
-              <a:spcBef>
-                <a:spcPts val="0"/>
-              </a:spcBef>
-              <a:spcAft>
-                <a:spcPts val="0"/>
-              </a:spcAft>
-              <a:buClrTx/>
-              <a:buSzTx/>
-              <a:buFont typeface="+mj-lt"/>
-              <a:buNone/>
-              <a:tabLst/>
-              <a:defRPr/>
-            </a:pPr>
-            <a:r>
-              <a:rPr lang="en-GB" b="1" i="0" dirty="0">
-                <a:solidFill>
-                  <a:srgbClr val="000000"/>
-                </a:solidFill>
-                <a:effectLst/>
-                <a:latin typeface="Arial" panose="020B0604020202020204" pitchFamily="34" charset="0"/>
-              </a:rPr>
-              <a:t>3. Data Analysis and Visualization (10 - 30 mins as included as part of this documentation being written)</a:t>
-            </a:r>
-          </a:p>
-          <a:p>
-            <a:pPr algn="l">
-              <a:buFont typeface="+mj-lt"/>
-              <a:buNone/>
-            </a:pPr>
-            <a:r>
-              <a:rPr lang="en-GB" b="1" i="0" dirty="0">
-                <a:solidFill>
-                  <a:srgbClr val="000000"/>
-                </a:solidFill>
-                <a:effectLst/>
-                <a:latin typeface="Arial" panose="020B0604020202020204" pitchFamily="34" charset="0"/>
-              </a:rPr>
-              <a:t>OBJECTIVES: </a:t>
-            </a:r>
-          </a:p>
-          <a:p>
-            <a:pPr marL="285750" lvl="0" indent="-285750" algn="l">
-              <a:buFont typeface="Courier New" panose="02070309020205020404" pitchFamily="49" charset="0"/>
-              <a:buChar char="o"/>
-            </a:pPr>
-            <a:r>
-              <a:rPr lang="en-GB" b="0" i="0" dirty="0">
-                <a:solidFill>
-                  <a:srgbClr val="000000"/>
-                </a:solidFill>
-                <a:effectLst/>
-                <a:latin typeface="Arial" panose="020B0604020202020204" pitchFamily="34" charset="0"/>
-              </a:rPr>
-              <a:t>Analyse the data to uncover interesting trends and patterns, document this exploratory analysis if considered relevant.</a:t>
-            </a:r>
-          </a:p>
-          <a:p>
-            <a:pPr marL="285750" lvl="0" indent="-285750" algn="l">
-              <a:buFont typeface="Courier New" panose="02070309020205020404" pitchFamily="49" charset="0"/>
-              <a:buChar char="o"/>
-            </a:pPr>
-            <a:r>
-              <a:rPr lang="en-GB" b="1" i="0" dirty="0">
-                <a:solidFill>
-                  <a:srgbClr val="000000"/>
-                </a:solidFill>
-                <a:effectLst/>
-                <a:latin typeface="Arial" panose="020B0604020202020204" pitchFamily="34" charset="0"/>
-              </a:rPr>
-              <a:t>You might like to answer questions such as</a:t>
-            </a:r>
-            <a:r>
-              <a:rPr lang="en-GB" b="0" i="0" dirty="0">
-                <a:solidFill>
-                  <a:srgbClr val="000000"/>
-                </a:solidFill>
-                <a:effectLst/>
-                <a:latin typeface="Arial" panose="020B0604020202020204" pitchFamily="34" charset="0"/>
-              </a:rPr>
-              <a:t>:</a:t>
-            </a:r>
-          </a:p>
-          <a:p>
-            <a:pPr marL="685800" lvl="1" indent="-228600" algn="l">
-              <a:buFont typeface="Arial" panose="020B0604020202020204" pitchFamily="34" charset="0"/>
-              <a:buChar char="§"/>
-            </a:pPr>
-            <a:r>
-              <a:rPr lang="en-GB" b="0" i="0" dirty="0">
-                <a:solidFill>
-                  <a:srgbClr val="000000"/>
-                </a:solidFill>
-                <a:effectLst/>
-                <a:latin typeface="Arial" panose="020B0604020202020204" pitchFamily="34" charset="0"/>
-              </a:rPr>
-              <a:t>Which region has the highest rent?</a:t>
-            </a:r>
-          </a:p>
-          <a:p>
-            <a:pPr marL="685800" lvl="1" indent="-228600" algn="l">
-              <a:buFont typeface="Arial" panose="020B0604020202020204" pitchFamily="34" charset="0"/>
-              <a:buChar char="§"/>
-            </a:pPr>
-            <a:r>
-              <a:rPr lang="en-GB" b="0" i="0" dirty="0">
-                <a:solidFill>
-                  <a:srgbClr val="000000"/>
-                </a:solidFill>
-                <a:effectLst/>
-                <a:latin typeface="Arial" panose="020B0604020202020204" pitchFamily="34" charset="0"/>
-              </a:rPr>
-              <a:t>Where are rents changing the fastest?</a:t>
-            </a:r>
-          </a:p>
-          <a:p>
-            <a:pPr marL="685800" lvl="1" indent="-228600" algn="l">
-              <a:buFont typeface="Arial" panose="020B0604020202020204" pitchFamily="34" charset="0"/>
-              <a:buChar char="§"/>
-            </a:pPr>
-            <a:r>
-              <a:rPr lang="en-GB" b="0" i="0" dirty="0">
-                <a:solidFill>
-                  <a:srgbClr val="000000"/>
-                </a:solidFill>
-                <a:effectLst/>
-                <a:latin typeface="Arial" panose="020B0604020202020204" pitchFamily="34" charset="0"/>
-              </a:rPr>
-              <a:t>Are there any real-world events that could be linked to observed trends?</a:t>
-            </a:r>
-          </a:p>
-          <a:p>
-            <a:pPr marL="285750" lvl="0" indent="-285750" algn="l">
-              <a:buFont typeface="Courier New" panose="02070309020205020404" pitchFamily="49" charset="0"/>
-              <a:buChar char="o"/>
-            </a:pPr>
-            <a:r>
-              <a:rPr lang="en-GB" b="0" i="0" dirty="0">
-                <a:solidFill>
-                  <a:srgbClr val="000000"/>
-                </a:solidFill>
-                <a:effectLst/>
-                <a:latin typeface="Arial" panose="020B0604020202020204" pitchFamily="34" charset="0"/>
-              </a:rPr>
-              <a:t>Using Power BI to create visual representations of your findings.</a:t>
-            </a:r>
-          </a:p>
-          <a:p>
-            <a:pPr marL="285750" lvl="0" indent="-285750" algn="l">
-              <a:buFont typeface="Courier New" panose="02070309020205020404" pitchFamily="49" charset="0"/>
-              <a:buChar char="o"/>
-            </a:pPr>
-            <a:r>
-              <a:rPr lang="en-GB" b="0" i="0" dirty="0">
-                <a:solidFill>
-                  <a:srgbClr val="000000"/>
-                </a:solidFill>
-                <a:effectLst/>
-                <a:latin typeface="Arial" panose="020B0604020202020204" pitchFamily="34" charset="0"/>
-              </a:rPr>
-              <a:t>Optionally, use the provided </a:t>
-            </a:r>
-            <a:r>
-              <a:rPr lang="en-GB" b="0" i="0" dirty="0">
-                <a:solidFill>
-                  <a:srgbClr val="1155CC"/>
-                </a:solidFill>
-                <a:effectLst/>
-                <a:latin typeface="Arial" panose="020B0604020202020204" pitchFamily="34" charset="0"/>
-                <a:hlinkClick r:id="rId3"/>
-              </a:rPr>
-              <a:t>regional council boundaries shapefile</a:t>
-            </a:r>
-            <a:r>
-              <a:rPr lang="en-GB" b="0" i="0" dirty="0">
-                <a:solidFill>
-                  <a:srgbClr val="000000"/>
-                </a:solidFill>
-                <a:effectLst/>
-                <a:latin typeface="Arial" panose="020B0604020202020204" pitchFamily="34" charset="0"/>
-              </a:rPr>
-              <a:t> to enhance your analysis and show some Geo analysis.</a:t>
-            </a:r>
-          </a:p>
-          <a:p>
-            <a:pPr marL="285750" lvl="0" indent="-285750" algn="l">
-              <a:buFont typeface="Courier New" panose="02070309020205020404" pitchFamily="49" charset="0"/>
-              <a:buChar char="o"/>
-            </a:pPr>
-            <a:endParaRPr lang="en-GB" b="0" i="0" dirty="0">
-              <a:solidFill>
-                <a:srgbClr val="000000"/>
-              </a:solidFill>
-              <a:effectLst/>
-              <a:latin typeface="Arial" panose="020B0604020202020204" pitchFamily="34" charset="0"/>
-            </a:endParaRPr>
-          </a:p>
-          <a:p>
-            <a:pPr marL="0" lvl="0" indent="0" algn="l">
-              <a:buFont typeface="Courier New" panose="02070309020205020404" pitchFamily="49" charset="0"/>
-              <a:buNone/>
-            </a:pPr>
-            <a:endParaRPr lang="en-GB" b="0" i="0" dirty="0">
-              <a:solidFill>
-                <a:srgbClr val="000000"/>
-              </a:solidFill>
-              <a:effectLst/>
-              <a:latin typeface="Arial" panose="020B0604020202020204" pitchFamily="34" charset="0"/>
-            </a:endParaRPr>
-          </a:p>
-          <a:p>
-            <a:pPr marL="0" lvl="0" indent="0" algn="l">
-              <a:buFont typeface="Courier New" panose="02070309020205020404" pitchFamily="49" charset="0"/>
-              <a:buNone/>
-            </a:pPr>
-            <a:endParaRPr lang="en-GB" b="0" i="0" dirty="0">
-              <a:solidFill>
-                <a:srgbClr val="000000"/>
-              </a:solidFill>
-              <a:effectLst/>
-              <a:latin typeface="Arial" panose="020B0604020202020204" pitchFamily="34" charset="0"/>
-            </a:endParaRPr>
-          </a:p>
-          <a:p>
-            <a:pPr marL="0" marR="0" lvl="0" indent="0" algn="l" defTabSz="914400" rtl="0" eaLnBrk="1" fontAlgn="auto" latinLnBrk="0" hangingPunct="1">
-              <a:lnSpc>
-                <a:spcPct val="100000"/>
-              </a:lnSpc>
-              <a:spcBef>
-                <a:spcPts val="0"/>
-              </a:spcBef>
-              <a:spcAft>
-                <a:spcPts val="0"/>
-              </a:spcAft>
-              <a:buClrTx/>
-              <a:buSzTx/>
-              <a:buFont typeface="Courier New" panose="02070309020205020404" pitchFamily="49" charset="0"/>
-              <a:buNone/>
-              <a:tabLst/>
-              <a:defRPr/>
-            </a:pPr>
-            <a:r>
-              <a:rPr lang="en-GB" b="1" i="0" dirty="0">
-                <a:solidFill>
-                  <a:srgbClr val="000000"/>
-                </a:solidFill>
-                <a:effectLst/>
-                <a:latin typeface="Arial" panose="020B0604020202020204" pitchFamily="34" charset="0"/>
-              </a:rPr>
-              <a:t>NOTES ON WORKFLOW</a:t>
-            </a:r>
-          </a:p>
-          <a:p>
-            <a:pPr marL="0" lvl="0" indent="0" algn="l">
-              <a:buFont typeface="Courier New" panose="02070309020205020404" pitchFamily="49" charset="0"/>
-              <a:buNone/>
-            </a:pPr>
-            <a:r>
-              <a:rPr lang="en-GB" b="0" i="0" dirty="0">
-                <a:solidFill>
-                  <a:srgbClr val="000000"/>
-                </a:solidFill>
-                <a:effectLst/>
-                <a:latin typeface="Arial" panose="020B0604020202020204" pitchFamily="34" charset="0"/>
-              </a:rPr>
-              <a:t>- Setting up the Ingestion/load into POWER BI was about 5-10mins</a:t>
-            </a:r>
-          </a:p>
-          <a:p>
-            <a:pPr marL="0" lvl="0" indent="0" algn="l">
-              <a:buFont typeface="Courier New" panose="02070309020205020404" pitchFamily="49" charset="0"/>
-              <a:buNone/>
-            </a:pPr>
-            <a:r>
-              <a:rPr lang="en-GB" b="0" i="0" dirty="0">
-                <a:solidFill>
-                  <a:srgbClr val="000000"/>
-                </a:solidFill>
-                <a:effectLst/>
-                <a:latin typeface="Arial" panose="020B0604020202020204" pitchFamily="34" charset="0"/>
-              </a:rPr>
-              <a:t>- Had issues with geospatial data, and logging into Azure so some problems with native visualisation tools and marketplace so kept the analysis VERY BASIC (only had 10-20mins to rush and document this </a:t>
-            </a:r>
-            <a:r>
-              <a:rPr lang="en-GB" b="0" i="0" dirty="0" err="1">
-                <a:solidFill>
-                  <a:srgbClr val="000000"/>
-                </a:solidFill>
-                <a:effectLst/>
-                <a:latin typeface="Arial" panose="020B0604020202020204" pitchFamily="34" charset="0"/>
-              </a:rPr>
-              <a:t>powerpoint</a:t>
-            </a:r>
-            <a:r>
-              <a:rPr lang="en-GB" b="0" i="0" dirty="0">
-                <a:solidFill>
-                  <a:srgbClr val="000000"/>
-                </a:solidFill>
-                <a:effectLst/>
-                <a:latin typeface="Arial" panose="020B0604020202020204" pitchFamily="34" charset="0"/>
-              </a:rPr>
-              <a:t>).</a:t>
-            </a:r>
-          </a:p>
-          <a:p>
-            <a:pPr marL="0" lvl="0" indent="0" algn="l">
-              <a:buFont typeface="Courier New" panose="02070309020205020404" pitchFamily="49" charset="0"/>
-              <a:buNone/>
-            </a:pPr>
-            <a:endParaRPr lang="en-GB" b="0" i="0" dirty="0">
-              <a:solidFill>
-                <a:srgbClr val="000000"/>
-              </a:solidFill>
-              <a:effectLst/>
-              <a:latin typeface="Arial" panose="020B0604020202020204" pitchFamily="34" charset="0"/>
-            </a:endParaRPr>
-          </a:p>
-          <a:p>
-            <a:pPr marL="285750" lvl="0" indent="-285750" algn="l">
-              <a:buFont typeface="Courier New" panose="02070309020205020404" pitchFamily="49" charset="0"/>
-              <a:buChar char="o"/>
-            </a:pPr>
-            <a:endParaRPr lang="en-GB" b="0" i="0" dirty="0">
-              <a:solidFill>
-                <a:srgbClr val="000000"/>
-              </a:solidFill>
-              <a:effectLst/>
-              <a:latin typeface="Arial" panose="020B0604020202020204" pitchFamily="34" charset="0"/>
-            </a:endParaRPr>
-          </a:p>
-          <a:p>
-            <a:pPr marL="285750" lvl="0" indent="-285750" algn="l">
-              <a:buFont typeface="Courier New" panose="02070309020205020404" pitchFamily="49" charset="0"/>
-              <a:buChar char="o"/>
-            </a:pPr>
-            <a:endParaRPr lang="en-GB" b="0" i="0" dirty="0">
-              <a:solidFill>
-                <a:srgbClr val="000000"/>
-              </a:solidFill>
-              <a:effectLst/>
-              <a:latin typeface="Arial" panose="020B0604020202020204" pitchFamily="34" charset="0"/>
-            </a:endParaRPr>
-          </a:p>
-          <a:p>
-            <a:pPr algn="l">
-              <a:buNone/>
-            </a:pPr>
-            <a:r>
-              <a:rPr lang="en-GB" b="1" i="0" dirty="0">
-                <a:solidFill>
-                  <a:srgbClr val="000000"/>
-                </a:solidFill>
-                <a:effectLst/>
-                <a:latin typeface="Arial" panose="020B0604020202020204" pitchFamily="34" charset="0"/>
-              </a:rPr>
-              <a:t>Deliverables</a:t>
-            </a:r>
-            <a:endParaRPr lang="en-GB" b="0" i="0" dirty="0">
-              <a:solidFill>
-                <a:srgbClr val="222222"/>
-              </a:solidFill>
-              <a:effectLst/>
-              <a:latin typeface="Arial" panose="020B0604020202020204" pitchFamily="34" charset="0"/>
-            </a:endParaRPr>
-          </a:p>
-          <a:p>
-            <a:pPr algn="l">
-              <a:buFont typeface="Arial" panose="020B0604020202020204" pitchFamily="34" charset="0"/>
-              <a:buChar char="•"/>
-            </a:pPr>
-            <a:r>
-              <a:rPr lang="en-GB" b="0" i="0" dirty="0">
-                <a:solidFill>
-                  <a:srgbClr val="000000"/>
-                </a:solidFill>
-                <a:effectLst/>
-                <a:latin typeface="Arial" panose="020B0604020202020204" pitchFamily="34" charset="0"/>
-              </a:rPr>
-              <a:t>Prepare a concise document outlining the steps you took during data acquisition and preparation, your ideas about data integration, key findings, and </a:t>
-            </a:r>
-            <a:r>
-              <a:rPr lang="en-GB" b="0" i="0" dirty="0" err="1">
-                <a:solidFill>
-                  <a:srgbClr val="000000"/>
-                </a:solidFill>
-                <a:effectLst/>
-                <a:latin typeface="Arial" panose="020B0604020202020204" pitchFamily="34" charset="0"/>
-              </a:rPr>
-              <a:t>insights.Clearly</a:t>
-            </a:r>
-            <a:r>
-              <a:rPr lang="en-GB" b="0" i="0" dirty="0">
-                <a:solidFill>
-                  <a:srgbClr val="000000"/>
-                </a:solidFill>
-                <a:effectLst/>
-                <a:latin typeface="Arial" panose="020B0604020202020204" pitchFamily="34" charset="0"/>
-              </a:rPr>
-              <a:t> state any assumptions or decisions you made during the assignment. (X)</a:t>
-            </a:r>
-          </a:p>
-          <a:p>
-            <a:pPr algn="l">
-              <a:buFont typeface="Arial" panose="020B0604020202020204" pitchFamily="34" charset="0"/>
-              <a:buChar char="•"/>
-            </a:pPr>
-            <a:r>
-              <a:rPr lang="en-GB" b="0" i="0" dirty="0">
-                <a:solidFill>
-                  <a:srgbClr val="000000"/>
-                </a:solidFill>
-                <a:effectLst/>
-                <a:latin typeface="Arial" panose="020B0604020202020204" pitchFamily="34" charset="0"/>
-              </a:rPr>
-              <a:t>Submit all code in a notebook used for data acquisition, cleaning, and loading (X)</a:t>
-            </a:r>
-          </a:p>
-          <a:p>
-            <a:pPr algn="l">
-              <a:buFont typeface="Arial" panose="020B0604020202020204" pitchFamily="34" charset="0"/>
-              <a:buChar char="•"/>
-            </a:pPr>
-            <a:r>
-              <a:rPr lang="en-GB" b="0" i="0" dirty="0">
-                <a:solidFill>
-                  <a:srgbClr val="000000"/>
-                </a:solidFill>
-                <a:effectLst/>
-                <a:latin typeface="Arial" panose="020B0604020202020204" pitchFamily="34" charset="0"/>
-              </a:rPr>
-              <a:t>Submit the .</a:t>
-            </a:r>
-            <a:r>
-              <a:rPr lang="en-GB" b="0" i="0" dirty="0" err="1">
-                <a:solidFill>
-                  <a:srgbClr val="000000"/>
-                </a:solidFill>
-                <a:effectLst/>
-                <a:latin typeface="Arial" panose="020B0604020202020204" pitchFamily="34" charset="0"/>
-              </a:rPr>
-              <a:t>pbix</a:t>
-            </a:r>
-            <a:r>
-              <a:rPr lang="en-GB" b="0" i="0" dirty="0">
-                <a:solidFill>
-                  <a:srgbClr val="000000"/>
-                </a:solidFill>
-                <a:effectLst/>
-                <a:latin typeface="Arial" panose="020B0604020202020204" pitchFamily="34" charset="0"/>
-              </a:rPr>
-              <a:t> file of your Power BI dashboard. (X)</a:t>
-            </a:r>
-          </a:p>
-          <a:p>
-            <a:pPr marL="0" marR="0" lvl="0" indent="0" algn="l" defTabSz="914400" rtl="0" eaLnBrk="1" fontAlgn="auto" latinLnBrk="0" hangingPunct="1">
-              <a:lnSpc>
-                <a:spcPct val="100000"/>
-              </a:lnSpc>
-              <a:spcBef>
-                <a:spcPts val="0"/>
-              </a:spcBef>
-              <a:spcAft>
-                <a:spcPts val="0"/>
-              </a:spcAft>
-              <a:buClrTx/>
-              <a:buSzTx/>
-              <a:buFontTx/>
-              <a:buNone/>
-              <a:tabLst/>
-              <a:defRPr/>
-            </a:pPr>
-            <a:endParaRPr lang="en-GB" b="1" i="0" dirty="0">
-              <a:solidFill>
-                <a:srgbClr val="000000"/>
-              </a:solidFill>
-              <a:effectLst/>
-              <a:latin typeface="Arial" panose="020B0604020202020204" pitchFamily="34" charset="0"/>
-            </a:endParaRPr>
-          </a:p>
-        </p:txBody>
-      </p:sp>
-      <p:sp>
-        <p:nvSpPr>
-          <p:cNvPr id="4" name="Slide Number Placeholder 3">
-            <a:extLst>
-              <a:ext uri="{FF2B5EF4-FFF2-40B4-BE49-F238E27FC236}">
-                <a16:creationId xmlns:a16="http://schemas.microsoft.com/office/drawing/2014/main" id="{8B16724B-FFC5-A8B0-5961-46D5260A4CA1}"/>
-              </a:ext>
-            </a:extLst>
-          </p:cNvPr>
-          <p:cNvSpPr>
-            <a:spLocks noGrp="1"/>
-          </p:cNvSpPr>
-          <p:nvPr>
-            <p:ph type="sldNum" sz="quarter" idx="5"/>
-          </p:nvPr>
-        </p:nvSpPr>
-        <p:spPr/>
-        <p:txBody>
-          <a:bodyPr/>
-          <a:lstStyle/>
-          <a:p>
-            <a:fld id="{D9D6686D-F8F1-4211-847C-71D5885CEA21}" type="slidenum">
-              <a:rPr lang="en-NZ" smtClean="0"/>
-              <a:t>4</a:t>
-            </a:fld>
-            <a:endParaRPr lang="en-NZ"/>
-          </a:p>
-        </p:txBody>
-      </p:sp>
-    </p:spTree>
-    <p:extLst>
-      <p:ext uri="{BB962C8B-B14F-4D97-AF65-F5344CB8AC3E}">
-        <p14:creationId xmlns:p14="http://schemas.microsoft.com/office/powerpoint/2010/main" val="1416244999"/>
-      </p:ext>
-    </p:extLst>
-  </p:cSld>
-  <p:clrMapOvr>
-    <a:masterClrMapping/>
-  </p:clrMapOvr>
-</p:notes>
-</file>
-
-<file path=ppt/notesSlides/notesSlide4.xml><?xml version="1.0" encoding="utf-8"?>
-<p:notes xmlns:a="http://schemas.openxmlformats.org/drawingml/2006/main" xmlns:r="http://schemas.openxmlformats.org/officeDocument/2006/relationships" xmlns:p="http://schemas.openxmlformats.org/presentationml/2006/main">
-  <p:cSld>
-    <p:spTree>
-      <p:nvGrpSpPr>
-        <p:cNvPr id="1" name="">
-          <a:extLst>
-            <a:ext uri="{FF2B5EF4-FFF2-40B4-BE49-F238E27FC236}">
               <a16:creationId xmlns:a16="http://schemas.microsoft.com/office/drawing/2014/main" id="{CF1797EB-10CD-54D8-D7E8-5F3298526E1F}"/>
             </a:ext>
           </a:extLst>
@@ -4172,7 +3583,7 @@
           <a:p>
             <a:fld id="{D9D6686D-F8F1-4211-847C-71D5885CEA21}" type="slidenum">
               <a:rPr lang="en-NZ" smtClean="0"/>
-              <a:t>5</a:t>
+              <a:t>4</a:t>
             </a:fld>
             <a:endParaRPr lang="en-NZ"/>
           </a:p>
@@ -4191,7 +3602,7 @@
 </p:notes>
 </file>
 
-<file path=ppt/notesSlides/notesSlide5.xml><?xml version="1.0" encoding="utf-8"?>
+<file path=ppt/notesSlides/notesSlide4.xml><?xml version="1.0" encoding="utf-8"?>
 <p:notes xmlns:a="http://schemas.openxmlformats.org/drawingml/2006/main" xmlns:r="http://schemas.openxmlformats.org/officeDocument/2006/relationships" xmlns:p="http://schemas.openxmlformats.org/presentationml/2006/main">
   <p:cSld>
     <p:spTree>
@@ -4364,7 +3775,7 @@
           <a:p>
             <a:fld id="{D9D6686D-F8F1-4211-847C-71D5885CEA21}" type="slidenum">
               <a:rPr lang="en-NZ" smtClean="0"/>
-              <a:t>6</a:t>
+              <a:t>5</a:t>
             </a:fld>
             <a:endParaRPr lang="en-NZ"/>
           </a:p>
@@ -4383,7 +3794,7 @@
 </p:notes>
 </file>
 
-<file path=ppt/notesSlides/notesSlide6.xml><?xml version="1.0" encoding="utf-8"?>
+<file path=ppt/notesSlides/notesSlide5.xml><?xml version="1.0" encoding="utf-8"?>
 <p:notes xmlns:a="http://schemas.openxmlformats.org/drawingml/2006/main" xmlns:r="http://schemas.openxmlformats.org/officeDocument/2006/relationships" xmlns:p="http://schemas.openxmlformats.org/presentationml/2006/main">
   <p:cSld>
     <p:spTree>
@@ -4830,6 +4241,16 @@
               <a:defRPr/>
             </a:pPr>
             <a:r>
+              <a:rPr lang="en-GB" b="1" i="0" dirty="0">
+                <a:solidFill>
+                  <a:srgbClr val="000000"/>
+                </a:solidFill>
+                <a:effectLst/>
+                <a:latin typeface="Arial" panose="020B0604020202020204" pitchFamily="34" charset="0"/>
+              </a:rPr>
+              <a:t>Also other impacts </a:t>
+            </a:r>
+            <a:r>
               <a:rPr lang="en-GB" b="0" i="0" dirty="0">
                 <a:solidFill>
                   <a:srgbClr val="000000"/>
@@ -4837,10 +4258,10 @@
                 <a:effectLst/>
                 <a:latin typeface="Arial" panose="020B0604020202020204" pitchFamily="34" charset="0"/>
               </a:rPr>
-              <a:t>Also other impacts around the same time are that of </a:t>
-            </a:r>
-            <a:r>
-              <a:rPr lang="en-GB" b="0" i="0" dirty="0" err="1">
+              <a:t>around the same time are that of </a:t>
+            </a:r>
+            <a:r>
+              <a:rPr lang="en-GB" b="1" i="0" dirty="0" err="1">
                 <a:solidFill>
                   <a:srgbClr val="000000"/>
                 </a:solidFill>
@@ -4857,8 +4278,45 @@
                 <a:effectLst/>
                 <a:latin typeface="Arial" panose="020B0604020202020204" pitchFamily="34" charset="0"/>
               </a:rPr>
-              <a:t> (short-term rentals replacing long-term tenures), the impact of COVID impacting the supply chain of materials, etc.</a:t>
-            </a:r>
+              <a:t> (short-term rentals replacing long-term tenures), </a:t>
+            </a:r>
+            <a:r>
+              <a:rPr lang="en-GB" b="1" i="0" dirty="0">
+                <a:solidFill>
+                  <a:srgbClr val="000000"/>
+                </a:solidFill>
+                <a:effectLst/>
+                <a:latin typeface="Arial" panose="020B0604020202020204" pitchFamily="34" charset="0"/>
+              </a:rPr>
+              <a:t>the impact of COVID </a:t>
+            </a:r>
+            <a:r>
+              <a:rPr lang="en-GB" b="0" i="0" dirty="0">
+                <a:solidFill>
+                  <a:srgbClr val="000000"/>
+                </a:solidFill>
+                <a:effectLst/>
+                <a:latin typeface="Arial" panose="020B0604020202020204" pitchFamily="34" charset="0"/>
+              </a:rPr>
+              <a:t>on the supply chain of materials, operations, and resources (time, materials, workers</a:t>
+            </a:r>
+            <a:r>
+              <a:rPr lang="en-GB" b="0" i="0">
+                <a:solidFill>
+                  <a:srgbClr val="000000"/>
+                </a:solidFill>
+                <a:effectLst/>
+                <a:latin typeface="Arial" panose="020B0604020202020204" pitchFamily="34" charset="0"/>
+              </a:rPr>
+              <a:t>, expenses).</a:t>
+            </a:r>
+            <a:endParaRPr lang="en-GB" b="0" i="0" dirty="0">
+              <a:solidFill>
+                <a:srgbClr val="000000"/>
+              </a:solidFill>
+              <a:effectLst/>
+              <a:latin typeface="Arial" panose="020B0604020202020204" pitchFamily="34" charset="0"/>
+            </a:endParaRPr>
           </a:p>
           <a:p>
             <a:pPr marL="0" marR="0" lvl="0" indent="0" algn="l" defTabSz="914400" rtl="0" eaLnBrk="1" fontAlgn="auto" latinLnBrk="0" hangingPunct="1">
@@ -4963,7 +4421,7 @@
           <a:p>
             <a:fld id="{D9D6686D-F8F1-4211-847C-71D5885CEA21}" type="slidenum">
               <a:rPr lang="en-NZ" smtClean="0"/>
-              <a:t>7</a:t>
+              <a:t>6</a:t>
             </a:fld>
             <a:endParaRPr lang="en-NZ"/>
           </a:p>
@@ -8824,6 +8282,93 @@
           </a:fontRef>
         </p:style>
       </p:cxnSp>
+      <p:sp>
+        <p:nvSpPr>
+          <p:cNvPr id="4" name="TextBox 3">
+            <a:extLst>
+              <a:ext uri="{FF2B5EF4-FFF2-40B4-BE49-F238E27FC236}">
+                <a16:creationId xmlns:a16="http://schemas.microsoft.com/office/drawing/2014/main" id="{2D2EAD7E-B307-07C4-BC6A-C12F56A3F489}"/>
+              </a:ext>
+            </a:extLst>
+          </p:cNvPr>
+          <p:cNvSpPr txBox="1"/>
+          <p:nvPr/>
+        </p:nvSpPr>
+        <p:spPr>
+          <a:xfrm>
+            <a:off x="4833257" y="5317550"/>
+            <a:ext cx="7214717" cy="369332"/>
+          </a:xfrm>
+          <a:prstGeom prst="rect">
+            <a:avLst/>
+          </a:prstGeom>
+          <a:noFill/>
+        </p:spPr>
+        <p:txBody>
+          <a:bodyPr wrap="square">
+            <a:spAutoFit/>
+          </a:bodyPr>
+          <a:lstStyle/>
+          <a:p>
+            <a:r>
+              <a:rPr lang="en-NZ" dirty="0">
+                <a:hlinkClick r:id="rId3"/>
+              </a:rPr>
+              <a:t>https://github.com/JoelEdwards372/CommerceCommission202505</a:t>
+            </a:r>
+            <a:endParaRPr lang="en-NZ" dirty="0"/>
+          </a:p>
+        </p:txBody>
+      </p:sp>
+      <p:sp>
+        <p:nvSpPr>
+          <p:cNvPr id="6" name="Arrow: Right 5">
+            <a:extLst>
+              <a:ext uri="{FF2B5EF4-FFF2-40B4-BE49-F238E27FC236}">
+                <a16:creationId xmlns:a16="http://schemas.microsoft.com/office/drawing/2014/main" id="{E7D20D72-2583-E608-BB79-F8776A17B877}"/>
+              </a:ext>
+            </a:extLst>
+          </p:cNvPr>
+          <p:cNvSpPr/>
+          <p:nvPr/>
+        </p:nvSpPr>
+        <p:spPr>
+          <a:xfrm>
+            <a:off x="1621135" y="5031028"/>
+            <a:ext cx="3212122" cy="942376"/>
+          </a:xfrm>
+          <a:prstGeom prst="rightArrow">
+            <a:avLst/>
+          </a:prstGeom>
+        </p:spPr>
+        <p:style>
+          <a:lnRef idx="2">
+            <a:schemeClr val="accent1">
+              <a:shade val="15000"/>
+            </a:schemeClr>
+          </a:lnRef>
+          <a:fillRef idx="1">
+            <a:schemeClr val="accent1"/>
+          </a:fillRef>
+          <a:effectRef idx="0">
+            <a:schemeClr val="accent1"/>
+          </a:effectRef>
+          <a:fontRef idx="minor">
+            <a:schemeClr val="lt1"/>
+          </a:fontRef>
+        </p:style>
+        <p:txBody>
+          <a:bodyPr rtlCol="0" anchor="ctr"/>
+          <a:lstStyle/>
+          <a:p>
+            <a:pPr algn="ctr"/>
+            <a:r>
+              <a:rPr lang="en-NZ" dirty="0"/>
+              <a:t>All files/documents are here</a:t>
+            </a:r>
+          </a:p>
+        </p:txBody>
+      </p:sp>
     </p:spTree>
     <p:extLst>
       <p:ext uri="{BB962C8B-B14F-4D97-AF65-F5344CB8AC3E}">
@@ -10042,7 +9587,7 @@
         <p:cNvPr id="1" name="">
           <a:extLst>
             <a:ext uri="{FF2B5EF4-FFF2-40B4-BE49-F238E27FC236}">
-              <a16:creationId xmlns:a16="http://schemas.microsoft.com/office/drawing/2014/main" id="{EF6D3F94-62DE-16C0-0EB9-AFE5EEAE33D7}"/>
+              <a16:creationId xmlns:a16="http://schemas.microsoft.com/office/drawing/2014/main" id="{E3667C25-FBD4-ABB8-D8E5-AC4854220002}"/>
             </a:ext>
           </a:extLst>
         </p:cNvPr>
@@ -10062,7 +9607,7 @@
           <p:cNvPr id="47" name="Rectangle 46">
             <a:extLst>
               <a:ext uri="{FF2B5EF4-FFF2-40B4-BE49-F238E27FC236}">
-                <a16:creationId xmlns:a16="http://schemas.microsoft.com/office/drawing/2014/main" id="{64D7B368-E39E-BC2B-4B81-AA11C1EC19FD}"/>
+                <a16:creationId xmlns:a16="http://schemas.microsoft.com/office/drawing/2014/main" id="{4E3D5077-8630-D641-CE6D-83258A061391}"/>
               </a:ext>
               <a:ext uri="{C183D7F6-B498-43B3-948B-1728B52AA6E4}">
                 <adec:decorative xmlns:adec="http://schemas.microsoft.com/office/drawing/2017/decorative" val="1"/>
@@ -10125,7 +9670,7 @@
           <p:cNvPr id="2" name="Title 1">
             <a:extLst>
               <a:ext uri="{FF2B5EF4-FFF2-40B4-BE49-F238E27FC236}">
-                <a16:creationId xmlns:a16="http://schemas.microsoft.com/office/drawing/2014/main" id="{CAF33C43-003C-0AC2-DA0C-F6014B4832FB}"/>
+                <a16:creationId xmlns:a16="http://schemas.microsoft.com/office/drawing/2014/main" id="{78D04097-0B47-A664-53B0-10954E0D7F31}"/>
               </a:ext>
             </a:extLst>
           </p:cNvPr>
@@ -10165,7 +9710,7 @@
           <p:cNvPr id="49" name="Rectangle 48">
             <a:extLst>
               <a:ext uri="{FF2B5EF4-FFF2-40B4-BE49-F238E27FC236}">
-                <a16:creationId xmlns:a16="http://schemas.microsoft.com/office/drawing/2014/main" id="{6DD2536F-0DA6-C460-2868-47590EED05AF}"/>
+                <a16:creationId xmlns:a16="http://schemas.microsoft.com/office/drawing/2014/main" id="{08E2DB64-8977-13CC-11D1-9499932FE01C}"/>
               </a:ext>
               <a:ext uri="{C183D7F6-B498-43B3-948B-1728B52AA6E4}">
                 <adec:decorative xmlns:adec="http://schemas.microsoft.com/office/drawing/2017/decorative" val="1"/>
@@ -10227,7 +9772,7 @@
           <p:cNvPr id="3" name="Subtitle 2">
             <a:extLst>
               <a:ext uri="{FF2B5EF4-FFF2-40B4-BE49-F238E27FC236}">
-                <a16:creationId xmlns:a16="http://schemas.microsoft.com/office/drawing/2014/main" id="{49996BCD-D065-3B30-93DC-E9993886E040}"/>
+                <a16:creationId xmlns:a16="http://schemas.microsoft.com/office/drawing/2014/main" id="{E7D94AD8-7EF9-FCFE-F8F5-EF9FE59773D2}"/>
               </a:ext>
             </a:extLst>
           </p:cNvPr>
@@ -10298,7 +9843,7 @@
     </p:spTree>
     <p:extLst>
       <p:ext uri="{BB962C8B-B14F-4D97-AF65-F5344CB8AC3E}">
-        <p14:creationId xmlns:p14="http://schemas.microsoft.com/office/powerpoint/2010/main" val="2989171997"/>
+        <p14:creationId xmlns:p14="http://schemas.microsoft.com/office/powerpoint/2010/main" val="2402752994"/>
       </p:ext>
     </p:extLst>
   </p:cSld>
@@ -10324,7 +9869,7 @@
         <p:cNvPr id="1" name="">
           <a:extLst>
             <a:ext uri="{FF2B5EF4-FFF2-40B4-BE49-F238E27FC236}">
-              <a16:creationId xmlns:a16="http://schemas.microsoft.com/office/drawing/2014/main" id="{E3667C25-FBD4-ABB8-D8E5-AC4854220002}"/>
+              <a16:creationId xmlns:a16="http://schemas.microsoft.com/office/drawing/2014/main" id="{0B976BD7-9807-7A6A-B601-17C5C4C4BBDB}"/>
             </a:ext>
           </a:extLst>
         </p:cNvPr>
@@ -10344,7 +9889,7 @@
           <p:cNvPr id="47" name="Rectangle 46">
             <a:extLst>
               <a:ext uri="{FF2B5EF4-FFF2-40B4-BE49-F238E27FC236}">
-                <a16:creationId xmlns:a16="http://schemas.microsoft.com/office/drawing/2014/main" id="{4E3D5077-8630-D641-CE6D-83258A061391}"/>
+                <a16:creationId xmlns:a16="http://schemas.microsoft.com/office/drawing/2014/main" id="{529D94D9-707E-8392-DB98-BB2E055283D7}"/>
               </a:ext>
               <a:ext uri="{C183D7F6-B498-43B3-948B-1728B52AA6E4}">
                 <adec:decorative xmlns:adec="http://schemas.microsoft.com/office/drawing/2017/decorative" val="1"/>
@@ -10404,50 +9949,10 @@
       </p:sp>
       <p:sp>
         <p:nvSpPr>
-          <p:cNvPr id="2" name="Title 1">
-            <a:extLst>
-              <a:ext uri="{FF2B5EF4-FFF2-40B4-BE49-F238E27FC236}">
-                <a16:creationId xmlns:a16="http://schemas.microsoft.com/office/drawing/2014/main" id="{78D04097-0B47-A664-53B0-10954E0D7F31}"/>
-              </a:ext>
-            </a:extLst>
-          </p:cNvPr>
-          <p:cNvSpPr>
-            <a:spLocks noGrp="1"/>
-          </p:cNvSpPr>
-          <p:nvPr>
-            <p:ph type="ctrTitle"/>
-          </p:nvPr>
-        </p:nvSpPr>
-        <p:spPr>
-          <a:xfrm>
-            <a:off x="1100051" y="489760"/>
-            <a:ext cx="10058400" cy="1146048"/>
-          </a:xfrm>
-        </p:spPr>
-        <p:txBody>
-          <a:bodyPr anchor="ctr">
-            <a:normAutofit/>
-          </a:bodyPr>
-          <a:lstStyle/>
-          <a:p>
-            <a:pPr lvl="0"/>
-            <a:r>
-              <a:rPr lang="en-US" sz="4800" i="1" dirty="0">
-                <a:solidFill>
-                  <a:srgbClr val="FFFFFF"/>
-                </a:solidFill>
-              </a:rPr>
-              <a:t>This map is not the territory</a:t>
-            </a:r>
-          </a:p>
-        </p:txBody>
-      </p:sp>
-      <p:sp>
-        <p:nvSpPr>
           <p:cNvPr id="49" name="Rectangle 48">
             <a:extLst>
               <a:ext uri="{FF2B5EF4-FFF2-40B4-BE49-F238E27FC236}">
-                <a16:creationId xmlns:a16="http://schemas.microsoft.com/office/drawing/2014/main" id="{08E2DB64-8977-13CC-11D1-9499932FE01C}"/>
+                <a16:creationId xmlns:a16="http://schemas.microsoft.com/office/drawing/2014/main" id="{99566113-7207-A831-6C36-2C8244E32285}"/>
               </a:ext>
               <a:ext uri="{C183D7F6-B498-43B3-948B-1728B52AA6E4}">
                 <adec:decorative xmlns:adec="http://schemas.microsoft.com/office/drawing/2017/decorative" val="1"/>
@@ -10504,248 +10009,6 @@
           </a:p>
         </p:txBody>
       </p:sp>
-      <p:sp>
-        <p:nvSpPr>
-          <p:cNvPr id="3" name="Subtitle 2">
-            <a:extLst>
-              <a:ext uri="{FF2B5EF4-FFF2-40B4-BE49-F238E27FC236}">
-                <a16:creationId xmlns:a16="http://schemas.microsoft.com/office/drawing/2014/main" id="{E7D94AD8-7EF9-FCFE-F8F5-EF9FE59773D2}"/>
-              </a:ext>
-            </a:extLst>
-          </p:cNvPr>
-          <p:cNvSpPr>
-            <a:spLocks noGrp="1"/>
-          </p:cNvSpPr>
-          <p:nvPr>
-            <p:ph type="subTitle" idx="1"/>
-          </p:nvPr>
-        </p:nvSpPr>
-        <p:spPr>
-          <a:xfrm>
-            <a:off x="1100051" y="5225240"/>
-            <a:ext cx="10058400" cy="1143000"/>
-          </a:xfrm>
-        </p:spPr>
-        <p:txBody>
-          <a:bodyPr>
-            <a:normAutofit fontScale="62500" lnSpcReduction="20000"/>
-          </a:bodyPr>
-          <a:lstStyle/>
-          <a:p>
-            <a:pPr marL="342900" indent="-342900">
-              <a:buFontTx/>
-              <a:buChar char="-"/>
-            </a:pPr>
-            <a:r>
-              <a:rPr lang="en-US" dirty="0">
-                <a:solidFill>
-                  <a:srgbClr val="FFFFFF"/>
-                </a:solidFill>
-              </a:rPr>
-              <a:t>ANALYSIS, VISUALISATION, This DOCUMENT (1/2 </a:t>
-            </a:r>
-            <a:r>
-              <a:rPr lang="en-US" dirty="0" err="1">
-                <a:solidFill>
-                  <a:srgbClr val="FFFFFF"/>
-                </a:solidFill>
-              </a:rPr>
-              <a:t>hr</a:t>
-            </a:r>
-            <a:r>
-              <a:rPr lang="en-US" dirty="0">
-                <a:solidFill>
-                  <a:srgbClr val="FFFFFF"/>
-                </a:solidFill>
-              </a:rPr>
-              <a:t> although much unaccounted time went into repairing fabric/power bi &amp; writing this document)</a:t>
-            </a:r>
-          </a:p>
-          <a:p>
-            <a:pPr marL="342900" indent="-342900">
-              <a:buFontTx/>
-              <a:buChar char="-"/>
-            </a:pPr>
-            <a:r>
-              <a:rPr lang="en-US" dirty="0">
-                <a:solidFill>
-                  <a:srgbClr val="FFFFFF"/>
-                </a:solidFill>
-              </a:rPr>
-              <a:t>Refer notes pane</a:t>
-            </a:r>
-          </a:p>
-        </p:txBody>
-      </p:sp>
-    </p:spTree>
-    <p:extLst>
-      <p:ext uri="{BB962C8B-B14F-4D97-AF65-F5344CB8AC3E}">
-        <p14:creationId xmlns:p14="http://schemas.microsoft.com/office/powerpoint/2010/main" val="2402752994"/>
-      </p:ext>
-    </p:extLst>
-  </p:cSld>
-  <p:clrMapOvr>
-    <a:masterClrMapping/>
-  </p:clrMapOvr>
-</p:sld>
-</file>
-
-<file path=ppt/slides/slide6.xml><?xml version="1.0" encoding="utf-8"?>
-<p:sld xmlns:a="http://schemas.openxmlformats.org/drawingml/2006/main" xmlns:r="http://schemas.openxmlformats.org/officeDocument/2006/relationships" xmlns:p="http://schemas.openxmlformats.org/presentationml/2006/main">
-  <p:cSld>
-    <p:bg>
-      <p:bgPr>
-        <a:solidFill>
-          <a:schemeClr val="bg1"/>
-        </a:solidFill>
-        <a:effectLst/>
-      </p:bgPr>
-    </p:bg>
-    <p:spTree>
-      <p:nvGrpSpPr>
-        <p:cNvPr id="1" name="">
-          <a:extLst>
-            <a:ext uri="{FF2B5EF4-FFF2-40B4-BE49-F238E27FC236}">
-              <a16:creationId xmlns:a16="http://schemas.microsoft.com/office/drawing/2014/main" id="{0B976BD7-9807-7A6A-B601-17C5C4C4BBDB}"/>
-            </a:ext>
-          </a:extLst>
-        </p:cNvPr>
-        <p:cNvGrpSpPr/>
-        <p:nvPr/>
-      </p:nvGrpSpPr>
-      <p:grpSpPr>
-        <a:xfrm>
-          <a:off x="0" y="0"/>
-          <a:ext cx="0" cy="0"/>
-          <a:chOff x="0" y="0"/>
-          <a:chExt cx="0" cy="0"/>
-        </a:xfrm>
-      </p:grpSpPr>
-      <p:sp>
-        <p:nvSpPr>
-          <p:cNvPr id="47" name="Rectangle 46">
-            <a:extLst>
-              <a:ext uri="{FF2B5EF4-FFF2-40B4-BE49-F238E27FC236}">
-                <a16:creationId xmlns:a16="http://schemas.microsoft.com/office/drawing/2014/main" id="{529D94D9-707E-8392-DB98-BB2E055283D7}"/>
-              </a:ext>
-              <a:ext uri="{C183D7F6-B498-43B3-948B-1728B52AA6E4}">
-                <adec:decorative xmlns:adec="http://schemas.microsoft.com/office/drawing/2017/decorative" val="1"/>
-              </a:ext>
-            </a:extLst>
-          </p:cNvPr>
-          <p:cNvSpPr>
-            <a:spLocks noGrp="1" noRot="1" noChangeAspect="1" noMove="1" noResize="1" noEditPoints="1" noAdjustHandles="1" noChangeArrowheads="1" noChangeShapeType="1" noTextEdit="1"/>
-          </p:cNvSpPr>
-          <p:nvPr>
-            <p:extLst>
-              <p:ext uri="{386F3935-93C4-4BCD-93E2-E3B085C9AB24}">
-                <p16:designElem xmlns:p16="http://schemas.microsoft.com/office/powerpoint/2015/main" val="1"/>
-              </p:ext>
-            </p:extLst>
-          </p:nvPr>
-        </p:nvSpPr>
-        <p:spPr>
-          <a:xfrm>
-            <a:off x="1507" y="0"/>
-            <a:ext cx="12192000" cy="6858000"/>
-          </a:xfrm>
-          <a:prstGeom prst="rect">
-            <a:avLst/>
-          </a:prstGeom>
-          <a:solidFill>
-            <a:schemeClr val="accent1"/>
-          </a:solidFill>
-          <a:ln>
-            <a:noFill/>
-          </a:ln>
-        </p:spPr>
-        <p:style>
-          <a:lnRef idx="2">
-            <a:schemeClr val="accent1">
-              <a:shade val="50000"/>
-            </a:schemeClr>
-          </a:lnRef>
-          <a:fillRef idx="1">
-            <a:schemeClr val="accent1"/>
-          </a:fillRef>
-          <a:effectRef idx="0">
-            <a:schemeClr val="accent1"/>
-          </a:effectRef>
-          <a:fontRef idx="minor">
-            <a:schemeClr val="lt1"/>
-          </a:fontRef>
-        </p:style>
-        <p:txBody>
-          <a:bodyPr rtlCol="0" anchor="ctr"/>
-          <a:lstStyle/>
-          <a:p>
-            <a:pPr algn="ctr"/>
-            <a:endParaRPr lang="en-US"/>
-          </a:p>
-        </p:txBody>
-      </p:sp>
-      <p:sp>
-        <p:nvSpPr>
-          <p:cNvPr id="49" name="Rectangle 48">
-            <a:extLst>
-              <a:ext uri="{FF2B5EF4-FFF2-40B4-BE49-F238E27FC236}">
-                <a16:creationId xmlns:a16="http://schemas.microsoft.com/office/drawing/2014/main" id="{99566113-7207-A831-6C36-2C8244E32285}"/>
-              </a:ext>
-              <a:ext uri="{C183D7F6-B498-43B3-948B-1728B52AA6E4}">
-                <adec:decorative xmlns:adec="http://schemas.microsoft.com/office/drawing/2017/decorative" val="1"/>
-              </a:ext>
-            </a:extLst>
-          </p:cNvPr>
-          <p:cNvSpPr>
-            <a:spLocks noGrp="1" noRot="1" noChangeAspect="1" noMove="1" noResize="1" noEditPoints="1" noAdjustHandles="1" noChangeArrowheads="1" noChangeShapeType="1" noTextEdit="1"/>
-          </p:cNvSpPr>
-          <p:nvPr>
-            <p:extLst>
-              <p:ext uri="{386F3935-93C4-4BCD-93E2-E3B085C9AB24}">
-                <p16:designElem xmlns:p16="http://schemas.microsoft.com/office/powerpoint/2015/main" val="1"/>
-              </p:ext>
-            </p:extLst>
-          </p:nvPr>
-        </p:nvSpPr>
-        <p:spPr bwMode="white">
-          <a:xfrm>
-            <a:off x="1507" y="4953000"/>
-            <a:ext cx="12188952" cy="1905000"/>
-          </a:xfrm>
-          <a:prstGeom prst="rect">
-            <a:avLst/>
-          </a:prstGeom>
-          <a:solidFill>
-            <a:srgbClr val="262626"/>
-          </a:solidFill>
-          <a:ln>
-            <a:noFill/>
-          </a:ln>
-        </p:spPr>
-        <p:style>
-          <a:lnRef idx="2">
-            <a:schemeClr val="accent1">
-              <a:shade val="50000"/>
-            </a:schemeClr>
-          </a:lnRef>
-          <a:fillRef idx="1">
-            <a:schemeClr val="accent1"/>
-          </a:fillRef>
-          <a:effectRef idx="0">
-            <a:schemeClr val="accent1"/>
-          </a:effectRef>
-          <a:fontRef idx="minor">
-            <a:schemeClr val="lt1"/>
-          </a:fontRef>
-        </p:style>
-        <p:txBody>
-          <a:bodyPr/>
-          <a:lstStyle/>
-          <a:p>
-            <a:endParaRPr lang="en-NZ"/>
-          </a:p>
-        </p:txBody>
-      </p:sp>
       <p:pic>
         <p:nvPicPr>
           <p:cNvPr id="5" name="Picture 4">
@@ -10920,7 +10183,7 @@
 </p:sld>
 </file>
 
-<file path=ppt/slides/slide7.xml><?xml version="1.0" encoding="utf-8"?>
+<file path=ppt/slides/slide6.xml><?xml version="1.0" encoding="utf-8"?>
 <p:sld xmlns:a="http://schemas.openxmlformats.org/drawingml/2006/main" xmlns:r="http://schemas.openxmlformats.org/officeDocument/2006/relationships" xmlns:p="http://schemas.openxmlformats.org/presentationml/2006/main">
   <p:cSld>
     <p:bg>
@@ -11718,6 +10981,15 @@
 </file>
 
 <file path=customXml/item1.xml><?xml version="1.0" encoding="utf-8"?>
+<?mso-contentType ?>
+<FormTemplates xmlns="http://schemas.microsoft.com/sharepoint/v3/contenttype/forms">
+  <Display>DocumentLibraryForm</Display>
+  <Edit>DocumentLibraryForm</Edit>
+  <New>DocumentLibraryForm</New>
+</FormTemplates>
+</file>
+
+<file path=customXml/item2.xml><?xml version="1.0" encoding="utf-8"?>
 <p:properties xmlns:p="http://schemas.microsoft.com/office/2006/metadata/properties" xmlns:xsi="http://www.w3.org/2001/XMLSchema-instance" xmlns:pc="http://schemas.microsoft.com/office/infopath/2007/PartnerControls">
   <documentManagement>
     <_ip_UnifiedCompliancePolicyUIAction xmlns="http://schemas.microsoft.com/sharepoint/v3" xsi:nil="true"/>
@@ -11735,15 +11007,6 @@
     <MediaServiceKeyPoints xmlns="71af3243-3dd4-4a8d-8c0d-dd76da1f02a5" xsi:nil="true"/>
   </documentManagement>
 </p:properties>
-</file>
-
-<file path=customXml/item2.xml><?xml version="1.0" encoding="utf-8"?>
-<?mso-contentType ?>
-<FormTemplates xmlns="http://schemas.microsoft.com/sharepoint/v3/contenttype/forms">
-  <Display>DocumentLibraryForm</Display>
-  <Edit>DocumentLibraryForm</Edit>
-  <New>DocumentLibraryForm</New>
-</FormTemplates>
 </file>
 
 <file path=customXml/item3.xml><?xml version="1.0" encoding="utf-8"?>
@@ -12053,6 +11316,14 @@
 </file>
 
 <file path=customXml/itemProps1.xml><?xml version="1.0" encoding="utf-8"?>
+<ds:datastoreItem xmlns:ds="http://schemas.openxmlformats.org/officeDocument/2006/customXml" ds:itemID="{19DAD249-BF80-48EF-9AFB-36A11BCDC2CE}">
+  <ds:schemaRefs>
+    <ds:schemaRef ds:uri="http://schemas.microsoft.com/sharepoint/v3/contenttype/forms"/>
+  </ds:schemaRefs>
+</ds:datastoreItem>
+</file>
+
+<file path=customXml/itemProps2.xml><?xml version="1.0" encoding="utf-8"?>
 <ds:datastoreItem xmlns:ds="http://schemas.openxmlformats.org/officeDocument/2006/customXml" ds:itemID="{6F4F4D41-822D-40F2-A7AC-E4E6CB36CA7A}">
   <ds:schemaRefs>
     <ds:schemaRef ds:uri="http://schemas.microsoft.com/office/2006/metadata/properties"/>
@@ -12060,14 +11331,6 @@
     <ds:schemaRef ds:uri="http://schemas.microsoft.com/sharepoint/v3"/>
     <ds:schemaRef ds:uri="71af3243-3dd4-4a8d-8c0d-dd76da1f02a5"/>
     <ds:schemaRef ds:uri="230e9df3-be65-4c73-a93b-d1236ebd677e"/>
-  </ds:schemaRefs>
-</ds:datastoreItem>
-</file>
-
-<file path=customXml/itemProps2.xml><?xml version="1.0" encoding="utf-8"?>
-<ds:datastoreItem xmlns:ds="http://schemas.openxmlformats.org/officeDocument/2006/customXml" ds:itemID="{19DAD249-BF80-48EF-9AFB-36A11BCDC2CE}">
-  <ds:schemaRefs>
-    <ds:schemaRef ds:uri="http://schemas.microsoft.com/sharepoint/v3/contenttype/forms"/>
   </ds:schemaRefs>
 </ds:datastoreItem>
 </file>

</xml_diff>